<commit_message>
few final touches on powerpoint
</commit_message>
<xml_diff>
--- a/Arc2Proj/Lab_Reports/Arc2_Project.pptx
+++ b/Arc2Proj/Lab_Reports/Arc2_Project.pptx
@@ -27,6 +27,7 @@
     <p:sldId id="276" r:id="rId21"/>
     <p:sldId id="277" r:id="rId22"/>
     <p:sldId id="278" r:id="rId23"/>
+    <p:sldId id="279" r:id="rId24"/>
   </p:sldIdLst>
   <p:sldSz cx="12192000" cy="6858000"/>
   <p:notesSz cx="6858000" cy="9144000"/>
@@ -657,7 +658,7 @@
           <a:p>
             <a:fld id="{72345051-2045-45DA-935E-2E3CA1A69ADC}" type="datetimeFigureOut">
               <a:rPr lang="en-US" smtClean="0"/>
-              <a:t>4/28/2021</a:t>
+              <a:t>4/29/2021</a:t>
             </a:fld>
             <a:endParaRPr lang="en-US" dirty="0"/>
           </a:p>
@@ -855,7 +856,7 @@
           <a:p>
             <a:fld id="{72345051-2045-45DA-935E-2E3CA1A69ADC}" type="datetimeFigureOut">
               <a:rPr lang="en-US" smtClean="0"/>
-              <a:t>4/28/2021</a:t>
+              <a:t>4/29/2021</a:t>
             </a:fld>
             <a:endParaRPr lang="en-US"/>
           </a:p>
@@ -1063,7 +1064,7 @@
           <a:p>
             <a:fld id="{72345051-2045-45DA-935E-2E3CA1A69ADC}" type="datetimeFigureOut">
               <a:rPr lang="en-US" smtClean="0"/>
-              <a:t>4/28/2021</a:t>
+              <a:t>4/29/2021</a:t>
             </a:fld>
             <a:endParaRPr lang="en-US"/>
           </a:p>
@@ -1285,7 +1286,7 @@
           <a:p>
             <a:fld id="{72345051-2045-45DA-935E-2E3CA1A69ADC}" type="datetimeFigureOut">
               <a:rPr lang="en-US" smtClean="0"/>
-              <a:t>4/28/2021</a:t>
+              <a:t>4/29/2021</a:t>
             </a:fld>
             <a:endParaRPr lang="en-US"/>
           </a:p>
@@ -2196,7 +2197,7 @@
           <a:p>
             <a:fld id="{72345051-2045-45DA-935E-2E3CA1A69ADC}" type="datetimeFigureOut">
               <a:rPr lang="en-US" smtClean="0"/>
-              <a:t>4/28/2021</a:t>
+              <a:t>4/29/2021</a:t>
             </a:fld>
             <a:endParaRPr lang="en-US"/>
           </a:p>
@@ -2799,7 +2800,7 @@
           <a:p>
             <a:fld id="{72345051-2045-45DA-935E-2E3CA1A69ADC}" type="datetimeFigureOut">
               <a:rPr lang="en-US" smtClean="0"/>
-              <a:t>4/28/2021</a:t>
+              <a:t>4/29/2021</a:t>
             </a:fld>
             <a:endParaRPr lang="en-US"/>
           </a:p>
@@ -3847,7 +3848,7 @@
           <a:p>
             <a:fld id="{72345051-2045-45DA-935E-2E3CA1A69ADC}" type="datetimeFigureOut">
               <a:rPr lang="en-US" smtClean="0"/>
-              <a:t>4/28/2021</a:t>
+              <a:t>4/29/2021</a:t>
             </a:fld>
             <a:endParaRPr lang="en-US"/>
           </a:p>
@@ -4631,7 +4632,7 @@
           <a:p>
             <a:fld id="{72345051-2045-45DA-935E-2E3CA1A69ADC}" type="datetimeFigureOut">
               <a:rPr lang="en-US" smtClean="0"/>
-              <a:t>4/28/2021</a:t>
+              <a:t>4/29/2021</a:t>
             </a:fld>
             <a:endParaRPr lang="en-US"/>
           </a:p>
@@ -5080,7 +5081,7 @@
           <a:p>
             <a:fld id="{72345051-2045-45DA-935E-2E3CA1A69ADC}" type="datetimeFigureOut">
               <a:rPr lang="en-US" smtClean="0"/>
-              <a:t>4/28/2021</a:t>
+              <a:t>4/29/2021</a:t>
             </a:fld>
             <a:endParaRPr lang="en-US"/>
           </a:p>
@@ -5397,7 +5398,7 @@
           <a:p>
             <a:fld id="{72345051-2045-45DA-935E-2E3CA1A69ADC}" type="datetimeFigureOut">
               <a:rPr lang="en-US" smtClean="0"/>
-              <a:t>4/28/2021</a:t>
+              <a:t>4/29/2021</a:t>
             </a:fld>
             <a:endParaRPr lang="en-US"/>
           </a:p>
@@ -6025,7 +6026,7 @@
           <a:p>
             <a:fld id="{72345051-2045-45DA-935E-2E3CA1A69ADC}" type="datetimeFigureOut">
               <a:rPr lang="en-US" smtClean="0"/>
-              <a:t>4/28/2021</a:t>
+              <a:t>4/29/2021</a:t>
             </a:fld>
             <a:endParaRPr lang="en-US"/>
           </a:p>
@@ -6598,7 +6599,7 @@
           <a:p>
             <a:fld id="{72345051-2045-45DA-935E-2E3CA1A69ADC}" type="datetimeFigureOut">
               <a:rPr lang="en-US" smtClean="0"/>
-              <a:t>4/28/2021</a:t>
+              <a:t>4/29/2021</a:t>
             </a:fld>
             <a:endParaRPr lang="en-US" dirty="0"/>
           </a:p>
@@ -12642,6 +12643,215 @@
 </p:sld>
 </file>
 
+<file path=ppt/slides/slide23.xml><?xml version="1.0" encoding="utf-8"?>
+<p:sld xmlns:a="http://schemas.openxmlformats.org/drawingml/2006/main" xmlns:r="http://schemas.openxmlformats.org/officeDocument/2006/relationships" xmlns:p="http://schemas.openxmlformats.org/presentationml/2006/main">
+  <p:cSld>
+    <p:spTree>
+      <p:nvGrpSpPr>
+        <p:cNvPr id="1" name=""/>
+        <p:cNvGrpSpPr/>
+        <p:nvPr/>
+      </p:nvGrpSpPr>
+      <p:grpSpPr>
+        <a:xfrm>
+          <a:off x="0" y="0"/>
+          <a:ext cx="0" cy="0"/>
+          <a:chOff x="0" y="0"/>
+          <a:chExt cx="0" cy="0"/>
+        </a:xfrm>
+      </p:grpSpPr>
+      <p:sp>
+        <p:nvSpPr>
+          <p:cNvPr id="2" name="Title 1">
+            <a:extLst>
+              <a:ext uri="{FF2B5EF4-FFF2-40B4-BE49-F238E27FC236}">
+                <a16:creationId xmlns:a16="http://schemas.microsoft.com/office/drawing/2014/main" id="{5024C300-8BCC-4CE1-AB27-9198825D2D59}"/>
+              </a:ext>
+            </a:extLst>
+          </p:cNvPr>
+          <p:cNvSpPr>
+            <a:spLocks noGrp="1"/>
+          </p:cNvSpPr>
+          <p:nvPr>
+            <p:ph type="title"/>
+          </p:nvPr>
+        </p:nvSpPr>
+        <p:spPr/>
+        <p:txBody>
+          <a:bodyPr>
+            <a:normAutofit/>
+          </a:bodyPr>
+          <a:lstStyle/>
+          <a:p>
+            <a:r>
+              <a:rPr lang="en-US" dirty="0"/>
+              <a:t>References</a:t>
+            </a:r>
+          </a:p>
+        </p:txBody>
+      </p:sp>
+      <p:sp>
+        <p:nvSpPr>
+          <p:cNvPr id="3" name="Content Placeholder 2">
+            <a:extLst>
+              <a:ext uri="{FF2B5EF4-FFF2-40B4-BE49-F238E27FC236}">
+                <a16:creationId xmlns:a16="http://schemas.microsoft.com/office/drawing/2014/main" id="{D0BCB85D-037B-4230-A80C-C6B8446FAFF0}"/>
+              </a:ext>
+            </a:extLst>
+          </p:cNvPr>
+          <p:cNvSpPr>
+            <a:spLocks noGrp="1"/>
+          </p:cNvSpPr>
+          <p:nvPr>
+            <p:ph idx="1"/>
+          </p:nvPr>
+        </p:nvSpPr>
+        <p:spPr>
+          <a:xfrm>
+            <a:off x="670421" y="1912606"/>
+            <a:ext cx="10515600" cy="4251960"/>
+          </a:xfrm>
+        </p:spPr>
+        <p:txBody>
+          <a:bodyPr>
+            <a:normAutofit/>
+          </a:bodyPr>
+          <a:lstStyle/>
+          <a:p>
+            <a:r>
+              <a:rPr lang="en-US" sz="1800" dirty="0"/>
+              <a:t>Fleming, D., Grimes, A., </a:t>
+            </a:r>
+            <a:r>
+              <a:rPr lang="en-US" sz="1800" dirty="0" err="1"/>
+              <a:t>Lebreton</a:t>
+            </a:r>
+            <a:r>
+              <a:rPr lang="en-US" sz="1800" dirty="0"/>
+              <a:t>, L., </a:t>
+            </a:r>
+            <a:r>
+              <a:rPr lang="en-US" sz="1800" dirty="0" err="1"/>
+              <a:t>Maré</a:t>
+            </a:r>
+            <a:r>
+              <a:rPr lang="en-US" sz="1800" dirty="0"/>
+              <a:t>, D., &amp; </a:t>
+            </a:r>
+            <a:r>
+              <a:rPr lang="en-US" sz="1800" dirty="0" err="1"/>
+              <a:t>Nunns</a:t>
+            </a:r>
+            <a:r>
+              <a:rPr lang="en-US" sz="1800" dirty="0"/>
+              <a:t>, P. (2018). Valuing sunshine. </a:t>
+            </a:r>
+            <a:r>
+              <a:rPr lang="en-US" sz="1800" i="1" dirty="0"/>
+              <a:t>Regional Science and Urban Economics</a:t>
+            </a:r>
+            <a:r>
+              <a:rPr lang="en-US" sz="1800" dirty="0"/>
+              <a:t>, </a:t>
+            </a:r>
+            <a:r>
+              <a:rPr lang="en-US" sz="1800" i="1" dirty="0"/>
+              <a:t>68</a:t>
+            </a:r>
+            <a:r>
+              <a:rPr lang="en-US" sz="1800" dirty="0"/>
+              <a:t>(November 2017), 268–276. https://doi.org/10.1016/j.regsciurbeco.2017.11.008</a:t>
+            </a:r>
+          </a:p>
+          <a:p>
+            <a:r>
+              <a:rPr lang="en-US" sz="1800" dirty="0"/>
+              <a:t>Joint, J. R. C. (2018). Photovoltaic Electricity. In </a:t>
+            </a:r>
+            <a:r>
+              <a:rPr lang="en-US" sz="1800" i="1" dirty="0"/>
+              <a:t>Submerged and Floating Photovoltaic Systems</a:t>
+            </a:r>
+            <a:r>
+              <a:rPr lang="en-US" sz="1800" dirty="0"/>
+              <a:t> (pp. 13–32). https://doi.org/10.1016/B978-0-12-812149-8.00002-8</a:t>
+            </a:r>
+          </a:p>
+          <a:p>
+            <a:r>
+              <a:rPr lang="en-US" sz="1800" dirty="0"/>
+              <a:t>Porter, D., Gowda, P., Marek, T., Howell, T., Moorhead, J., &amp; Irmak, S. (2012). SENSITIVITY OF GRASS- AND ALFALFA-REFERENCE EVAPOTRANSPIRATION TO WEATHER STATION SENSOR ACCURACY. </a:t>
+            </a:r>
+            <a:r>
+              <a:rPr lang="en-US" sz="1800" i="1" dirty="0"/>
+              <a:t>Applied Engineering in Agriculture</a:t>
+            </a:r>
+            <a:r>
+              <a:rPr lang="en-US" sz="1800" dirty="0"/>
+              <a:t>, </a:t>
+            </a:r>
+            <a:r>
+              <a:rPr lang="en-US" sz="1800" i="1" dirty="0"/>
+              <a:t>28</a:t>
+            </a:r>
+            <a:r>
+              <a:rPr lang="en-US" sz="1800" dirty="0"/>
+              <a:t>(4), 543–549.</a:t>
+            </a:r>
+          </a:p>
+          <a:p>
+            <a:r>
+              <a:rPr lang="en-US" sz="1800" dirty="0"/>
+              <a:t>World Meteorological Organization. (2018). Guide to Meteorological Instruments and Methods of Observation: Part I - </a:t>
+            </a:r>
+            <a:r>
+              <a:rPr lang="en-US" sz="1800" dirty="0" err="1"/>
+              <a:t>MeasureMent</a:t>
+            </a:r>
+            <a:r>
+              <a:rPr lang="en-US" sz="1800" dirty="0"/>
+              <a:t> of </a:t>
+            </a:r>
+            <a:r>
+              <a:rPr lang="en-US" sz="1800" dirty="0" err="1"/>
+              <a:t>MeteorologIcal</a:t>
+            </a:r>
+            <a:r>
+              <a:rPr lang="en-US" sz="1800" dirty="0"/>
+              <a:t> </a:t>
+            </a:r>
+            <a:r>
+              <a:rPr lang="en-US" sz="1800" dirty="0" err="1"/>
+              <a:t>VarIaBles</a:t>
+            </a:r>
+            <a:r>
+              <a:rPr lang="en-US" sz="1800" dirty="0"/>
+              <a:t>. In </a:t>
+            </a:r>
+            <a:r>
+              <a:rPr lang="en-US" sz="1800" i="1" dirty="0"/>
+              <a:t>Quality Assurance</a:t>
+            </a:r>
+            <a:r>
+              <a:rPr lang="en-US" sz="1800" dirty="0"/>
+              <a:t>. Retrieved from www.wm</a:t>
+            </a:r>
+          </a:p>
+        </p:txBody>
+      </p:sp>
+    </p:spTree>
+    <p:extLst>
+      <p:ext uri="{BB962C8B-B14F-4D97-AF65-F5344CB8AC3E}">
+        <p14:creationId xmlns:p14="http://schemas.microsoft.com/office/powerpoint/2010/main" val="1635721025"/>
+      </p:ext>
+    </p:extLst>
+  </p:cSld>
+  <p:clrMapOvr>
+    <a:masterClrMapping/>
+  </p:clrMapOvr>
+</p:sld>
+</file>
+
 <file path=ppt/slides/slide3.xml><?xml version="1.0" encoding="utf-8"?>
 <p:sld xmlns:a="http://schemas.openxmlformats.org/drawingml/2006/main" xmlns:r="http://schemas.openxmlformats.org/officeDocument/2006/relationships" xmlns:p="http://schemas.openxmlformats.org/presentationml/2006/main">
   <p:cSld>
@@ -12830,6 +13040,36 @@
           </a:p>
         </p:txBody>
       </p:sp>
+      <p:pic>
+        <p:nvPicPr>
+          <p:cNvPr id="5" name="Picture 4">
+            <a:extLst>
+              <a:ext uri="{FF2B5EF4-FFF2-40B4-BE49-F238E27FC236}">
+                <a16:creationId xmlns:a16="http://schemas.microsoft.com/office/drawing/2014/main" id="{0D0753AC-E759-40AF-BBC0-5C01B6BF42E3}"/>
+              </a:ext>
+            </a:extLst>
+          </p:cNvPr>
+          <p:cNvPicPr>
+            <a:picLocks noChangeAspect="1"/>
+          </p:cNvPicPr>
+          <p:nvPr/>
+        </p:nvPicPr>
+        <p:blipFill>
+          <a:blip r:embed="rId2"/>
+          <a:stretch>
+            <a:fillRect/>
+          </a:stretch>
+        </p:blipFill>
+        <p:spPr>
+          <a:xfrm>
+            <a:off x="4377481" y="3109388"/>
+            <a:ext cx="2933700" cy="1209675"/>
+          </a:xfrm>
+          <a:prstGeom prst="rect">
+            <a:avLst/>
+          </a:prstGeom>
+        </p:spPr>
+      </p:pic>
     </p:spTree>
     <p:extLst>
       <p:ext uri="{BB962C8B-B14F-4D97-AF65-F5344CB8AC3E}">

</xml_diff>